<commit_message>
made some kind of progress I guess
</commit_message>
<xml_diff>
--- a/Ge-SpMM_julia.pptx
+++ b/Ge-SpMM_julia.pptx
@@ -110,6 +110,11 @@
       </a:defRPr>
     </a:lvl9pPr>
   </p:defaultTextStyle>
+  <p:extLst>
+    <p:ext uri="{EFAFB233-063F-42B5-8137-9DF3F51BA10A}">
+      <p15:sldGuideLst xmlns:p15="http://schemas.microsoft.com/office/powerpoint/2012/main"/>
+    </p:ext>
+  </p:extLst>
 </p:presentation>
 </file>
 
@@ -387,7 +392,7 @@
           <a:p>
             <a:fld id="{6190EB64-A348-4F2D-BF84-77D1A111D3BB}" type="datetimeFigureOut">
               <a:rPr lang="en-US" smtClean="0"/>
-              <a:t>21/08/26</a:t>
+              <a:t>21/08/27</a:t>
             </a:fld>
             <a:endParaRPr lang="en-US"/>
           </a:p>
@@ -801,7 +806,7 @@
           <a:p>
             <a:fld id="{6190EB64-A348-4F2D-BF84-77D1A111D3BB}" type="datetimeFigureOut">
               <a:rPr lang="en-US" smtClean="0"/>
-              <a:t>21/08/26</a:t>
+              <a:t>21/08/27</a:t>
             </a:fld>
             <a:endParaRPr lang="en-US"/>
           </a:p>
@@ -1137,7 +1142,7 @@
           <a:p>
             <a:fld id="{6190EB64-A348-4F2D-BF84-77D1A111D3BB}" type="datetimeFigureOut">
               <a:rPr lang="en-US" smtClean="0"/>
-              <a:t>21/08/26</a:t>
+              <a:t>21/08/27</a:t>
             </a:fld>
             <a:endParaRPr lang="en-US"/>
           </a:p>
@@ -1542,7 +1547,7 @@
           <a:p>
             <a:fld id="{6190EB64-A348-4F2D-BF84-77D1A111D3BB}" type="datetimeFigureOut">
               <a:rPr lang="en-US" smtClean="0"/>
-              <a:t>21/08/26</a:t>
+              <a:t>21/08/27</a:t>
             </a:fld>
             <a:endParaRPr lang="en-US"/>
           </a:p>
@@ -2110,7 +2115,7 @@
           <a:p>
             <a:fld id="{6190EB64-A348-4F2D-BF84-77D1A111D3BB}" type="datetimeFigureOut">
               <a:rPr lang="en-US" smtClean="0"/>
-              <a:t>21/08/26</a:t>
+              <a:t>21/08/27</a:t>
             </a:fld>
             <a:endParaRPr lang="en-US"/>
           </a:p>
@@ -2791,7 +2796,7 @@
           <a:p>
             <a:fld id="{6190EB64-A348-4F2D-BF84-77D1A111D3BB}" type="datetimeFigureOut">
               <a:rPr lang="en-US" smtClean="0"/>
-              <a:t>21/08/26</a:t>
+              <a:t>21/08/27</a:t>
             </a:fld>
             <a:endParaRPr lang="en-US"/>
           </a:p>
@@ -3704,7 +3709,7 @@
           <a:p>
             <a:fld id="{6190EB64-A348-4F2D-BF84-77D1A111D3BB}" type="datetimeFigureOut">
               <a:rPr lang="en-US" smtClean="0"/>
-              <a:t>21/08/26</a:t>
+              <a:t>21/08/27</a:t>
             </a:fld>
             <a:endParaRPr lang="en-US"/>
           </a:p>
@@ -4017,7 +4022,7 @@
           <a:p>
             <a:fld id="{6190EB64-A348-4F2D-BF84-77D1A111D3BB}" type="datetimeFigureOut">
               <a:rPr lang="en-US" smtClean="0"/>
-              <a:t>21/08/26</a:t>
+              <a:t>21/08/27</a:t>
             </a:fld>
             <a:endParaRPr lang="en-US"/>
           </a:p>
@@ -4281,7 +4286,7 @@
           <a:p>
             <a:fld id="{6190EB64-A348-4F2D-BF84-77D1A111D3BB}" type="datetimeFigureOut">
               <a:rPr lang="en-US" smtClean="0"/>
-              <a:t>21/08/26</a:t>
+              <a:t>21/08/27</a:t>
             </a:fld>
             <a:endParaRPr lang="en-US"/>
           </a:p>
@@ -4604,7 +4609,7 @@
           <a:p>
             <a:fld id="{6190EB64-A348-4F2D-BF84-77D1A111D3BB}" type="datetimeFigureOut">
               <a:rPr lang="en-US" smtClean="0"/>
-              <a:t>21/08/26</a:t>
+              <a:t>21/08/27</a:t>
             </a:fld>
             <a:endParaRPr lang="en-US"/>
           </a:p>
@@ -4993,7 +4998,7 @@
           <a:p>
             <a:fld id="{6190EB64-A348-4F2D-BF84-77D1A111D3BB}" type="datetimeFigureOut">
               <a:rPr lang="en-US" smtClean="0"/>
-              <a:t>21/08/26</a:t>
+              <a:t>21/08/27</a:t>
             </a:fld>
             <a:endParaRPr lang="en-US"/>
           </a:p>
@@ -5369,7 +5374,7 @@
           <a:p>
             <a:fld id="{6190EB64-A348-4F2D-BF84-77D1A111D3BB}" type="datetimeFigureOut">
               <a:rPr lang="en-US" smtClean="0"/>
-              <a:t>21/08/26</a:t>
+              <a:t>21/08/27</a:t>
             </a:fld>
             <a:endParaRPr lang="en-US"/>
           </a:p>
@@ -5875,7 +5880,7 @@
           <a:p>
             <a:fld id="{6190EB64-A348-4F2D-BF84-77D1A111D3BB}" type="datetimeFigureOut">
               <a:rPr lang="en-US" smtClean="0"/>
-              <a:t>21/08/26</a:t>
+              <a:t>21/08/27</a:t>
             </a:fld>
             <a:endParaRPr lang="en-US"/>
           </a:p>
@@ -6132,7 +6137,7 @@
           <a:p>
             <a:fld id="{6190EB64-A348-4F2D-BF84-77D1A111D3BB}" type="datetimeFigureOut">
               <a:rPr lang="en-US" smtClean="0"/>
-              <a:t>21/08/26</a:t>
+              <a:t>21/08/27</a:t>
             </a:fld>
             <a:endParaRPr lang="en-US"/>
           </a:p>
@@ -6295,7 +6300,7 @@
           <a:p>
             <a:fld id="{6190EB64-A348-4F2D-BF84-77D1A111D3BB}" type="datetimeFigureOut">
               <a:rPr lang="en-US" smtClean="0"/>
-              <a:t>21/08/26</a:t>
+              <a:t>21/08/27</a:t>
             </a:fld>
             <a:endParaRPr lang="en-US"/>
           </a:p>
@@ -6685,7 +6690,7 @@
           <a:p>
             <a:fld id="{6190EB64-A348-4F2D-BF84-77D1A111D3BB}" type="datetimeFigureOut">
               <a:rPr lang="en-US" smtClean="0"/>
-              <a:t>21/08/26</a:t>
+              <a:t>21/08/27</a:t>
             </a:fld>
             <a:endParaRPr lang="en-US"/>
           </a:p>
@@ -7094,7 +7099,7 @@
           <a:p>
             <a:fld id="{6190EB64-A348-4F2D-BF84-77D1A111D3BB}" type="datetimeFigureOut">
               <a:rPr lang="en-US" smtClean="0"/>
-              <a:t>21/08/26</a:t>
+              <a:t>21/08/27</a:t>
             </a:fld>
             <a:endParaRPr lang="en-US"/>
           </a:p>
@@ -7338,7 +7343,7 @@
           <a:p>
             <a:fld id="{6190EB64-A348-4F2D-BF84-77D1A111D3BB}" type="datetimeFigureOut">
               <a:rPr lang="en-US" smtClean="0"/>
-              <a:t>21/08/26</a:t>
+              <a:t>21/08/27</a:t>
             </a:fld>
             <a:endParaRPr lang="en-US"/>
           </a:p>
@@ -8022,8 +8027,8 @@
           </a:p>
         </p:txBody>
       </p:sp>
-      <mc:AlternateContent xmlns:mc="http://schemas.openxmlformats.org/markup-compatibility/2006">
-        <mc:Choice xmlns:a14="http://schemas.microsoft.com/office/drawing/2010/main" Requires="a14">
+      <mc:AlternateContent xmlns:mc="http://schemas.openxmlformats.org/markup-compatibility/2006" xmlns:a14="http://schemas.microsoft.com/office/drawing/2010/main">
+        <mc:Choice Requires="a14">
           <p:sp>
             <p:nvSpPr>
               <p:cNvPr id="3" name="Content Placeholder 2">
@@ -8561,7 +8566,7 @@
             </p:txBody>
           </p:sp>
         </mc:Choice>
-        <mc:Fallback>
+        <mc:Fallback xmlns="">
           <p:sp>
             <p:nvSpPr>
               <p:cNvPr id="3" name="Content Placeholder 2">
@@ -12071,8 +12076,13 @@
           <a:p>
             <a:r>
               <a:rPr lang="en-US" dirty="0"/>
-              <a:t>Implementing in Julia (p1)</a:t>
-            </a:r>
+              <a:t>Implementing </a:t>
+            </a:r>
+            <a:r>
+              <a:rPr lang="en-US"/>
+              <a:t>in Julia</a:t>
+            </a:r>
+            <a:endParaRPr lang="en-US" dirty="0"/>
           </a:p>
         </p:txBody>
       </p:sp>

</xml_diff>